<commit_message>
Exploring detrending and models
</commit_message>
<xml_diff>
--- a/Presentation.pptx
+++ b/Presentation.pptx
@@ -17,7 +17,7 @@
     <p:sldId id="462" r:id="rId5"/>
     <p:sldId id="463" r:id="rId6"/>
     <p:sldId id="464" r:id="rId7"/>
-    <p:sldId id="465" r:id="rId8"/>
+    <p:sldId id="470" r:id="rId8"/>
     <p:sldId id="466" r:id="rId9"/>
     <p:sldId id="468" r:id="rId10"/>
     <p:sldId id="469" r:id="rId11"/>
@@ -1536,7 +1536,7 @@
     </p:spTree>
     <p:extLst>
       <p:ext uri="{BB962C8B-B14F-4D97-AF65-F5344CB8AC3E}">
-        <p14:creationId xmlns:p14="http://schemas.microsoft.com/office/powerpoint/2010/main" val="1728752252"/>
+        <p14:creationId xmlns:p14="http://schemas.microsoft.com/office/powerpoint/2010/main" val="4076903263"/>
       </p:ext>
     </p:extLst>
   </p:cSld>
@@ -6383,7 +6383,7 @@
               </a14:hiddenLine>
             </a:ext>
             <a:ext uri="{FAA26D3D-D897-4be2-8F04-BA451C77F1D7}">
-              <ma14:placeholderFlag xmlns:ma14="http://schemas.microsoft.com/office/mac/drawingml/2011/main" xmlns="" val="1"/>
+              <ma14:placeholderFlag xmlns="" xmlns:ma14="http://schemas.microsoft.com/office/mac/drawingml/2011/main" val="1"/>
             </a:ext>
           </a:extLst>
         </p:spPr>
@@ -7307,6 +7307,44 @@
                   <a:schemeClr val="tx1"/>
                 </a:solidFill>
               </a:rPr>
+              <a:t>Linear</a:t>
+            </a:r>
+            <a:r>
+              <a:rPr lang="sv-SE" dirty="0">
+                <a:solidFill>
+                  <a:schemeClr val="tx1"/>
+                </a:solidFill>
+              </a:rPr>
+              <a:t> </a:t>
+            </a:r>
+            <a:r>
+              <a:rPr lang="sv-SE" dirty="0" err="1">
+                <a:solidFill>
+                  <a:schemeClr val="tx1"/>
+                </a:solidFill>
+              </a:rPr>
+              <a:t>detrending</a:t>
+            </a:r>
+            <a:r>
+              <a:rPr lang="sv-SE" dirty="0">
+                <a:solidFill>
+                  <a:schemeClr val="tx1"/>
+                </a:solidFill>
+              </a:rPr>
+              <a:t>, ARMA(2,0,1)x(1,1,0)[52]</a:t>
+            </a:r>
+          </a:p>
+          <a:p>
+            <a:pPr lvl="1">
+              <a:buFont typeface="Arial" panose="020B0604020202020204" pitchFamily="34" charset="0"/>
+              <a:buChar char="•"/>
+            </a:pPr>
+            <a:r>
+              <a:rPr lang="sv-SE" dirty="0" err="1">
+                <a:solidFill>
+                  <a:schemeClr val="tx1"/>
+                </a:solidFill>
+              </a:rPr>
               <a:t>Better</a:t>
             </a:r>
             <a:r>
@@ -7405,10 +7443,10 @@
       </p:sp>
       <p:pic>
         <p:nvPicPr>
-          <p:cNvPr id="3" name="Picture 2">
+          <p:cNvPr id="4" name="Picture 3">
             <a:extLst>
               <a:ext uri="{FF2B5EF4-FFF2-40B4-BE49-F238E27FC236}">
-                <a16:creationId xmlns:a16="http://schemas.microsoft.com/office/drawing/2014/main" id="{91FB6E14-A4E2-43DC-BE5F-70AAD0FC3FEB}"/>
+                <a16:creationId xmlns:a16="http://schemas.microsoft.com/office/drawing/2014/main" id="{62BED9F1-5CA7-4D9E-AA0C-8071F3E78AB6}"/>
               </a:ext>
             </a:extLst>
           </p:cNvPr>
@@ -7425,8 +7463,68 @@
         </p:blipFill>
         <p:spPr>
           <a:xfrm>
-            <a:off x="948776" y="1912373"/>
-            <a:ext cx="4005577" cy="2279685"/>
+            <a:off x="5226272" y="2259451"/>
+            <a:ext cx="3430368" cy="2146203"/>
+          </a:xfrm>
+          <a:prstGeom prst="rect">
+            <a:avLst/>
+          </a:prstGeom>
+        </p:spPr>
+      </p:pic>
+      <p:pic>
+        <p:nvPicPr>
+          <p:cNvPr id="9" name="Picture 8">
+            <a:extLst>
+              <a:ext uri="{FF2B5EF4-FFF2-40B4-BE49-F238E27FC236}">
+                <a16:creationId xmlns:a16="http://schemas.microsoft.com/office/drawing/2014/main" id="{1DDA98C9-EF53-49D3-94B0-C71419E54798}"/>
+              </a:ext>
+            </a:extLst>
+          </p:cNvPr>
+          <p:cNvPicPr>
+            <a:picLocks noChangeAspect="1"/>
+          </p:cNvPicPr>
+          <p:nvPr/>
+        </p:nvPicPr>
+        <p:blipFill>
+          <a:blip r:embed="rId4"/>
+          <a:stretch>
+            <a:fillRect/>
+          </a:stretch>
+        </p:blipFill>
+        <p:spPr>
+          <a:xfrm>
+            <a:off x="5226272" y="1636231"/>
+            <a:ext cx="3123325" cy="562100"/>
+          </a:xfrm>
+          <a:prstGeom prst="rect">
+            <a:avLst/>
+          </a:prstGeom>
+        </p:spPr>
+      </p:pic>
+      <p:pic>
+        <p:nvPicPr>
+          <p:cNvPr id="10" name="Picture 9">
+            <a:extLst>
+              <a:ext uri="{FF2B5EF4-FFF2-40B4-BE49-F238E27FC236}">
+                <a16:creationId xmlns:a16="http://schemas.microsoft.com/office/drawing/2014/main" id="{8DC4D2EE-E714-4CA6-8BBB-D5BE9447A6E2}"/>
+              </a:ext>
+            </a:extLst>
+          </p:cNvPr>
+          <p:cNvPicPr>
+            <a:picLocks noChangeAspect="1"/>
+          </p:cNvPicPr>
+          <p:nvPr/>
+        </p:nvPicPr>
+        <p:blipFill>
+          <a:blip r:embed="rId5"/>
+          <a:stretch>
+            <a:fillRect/>
+          </a:stretch>
+        </p:blipFill>
+        <p:spPr>
+          <a:xfrm>
+            <a:off x="955677" y="2198331"/>
+            <a:ext cx="3573005" cy="2204412"/>
           </a:xfrm>
           <a:prstGeom prst="rect">
             <a:avLst/>
@@ -7652,6 +7750,20 @@
                 </a:solidFill>
               </a:rPr>
               <a:t>?</a:t>
+            </a:r>
+          </a:p>
+          <a:p>
+            <a:pPr lvl="2">
+              <a:buFont typeface="Arial" panose="020B0604020202020204" pitchFamily="34" charset="0"/>
+              <a:buChar char="•"/>
+            </a:pPr>
+            <a:r>
+              <a:rPr lang="sv-SE" dirty="0">
+                <a:solidFill>
+                  <a:schemeClr val="tx1"/>
+                </a:solidFill>
+              </a:rPr>
+              <a:t>GARCH?</a:t>
             </a:r>
           </a:p>
           <a:p>
@@ -8111,6 +8223,42 @@
                 <a:hlinkClick r:id="rId3"/>
               </a:rPr>
               <a:t>https://www.onthesnow.com/california/mammoth-mountain-ski-area/historical-snowfall.html</a:t>
+            </a:r>
+            <a:r>
+              <a:rPr lang="sv-SE" dirty="0"/>
+              <a:t> </a:t>
+            </a:r>
+            <a:r>
+              <a:rPr lang="sv-SE" dirty="0">
+                <a:solidFill>
+                  <a:schemeClr val="tx1"/>
+                </a:solidFill>
+              </a:rPr>
+              <a:t>431 </a:t>
+            </a:r>
+            <a:r>
+              <a:rPr lang="sv-SE" dirty="0" err="1">
+                <a:solidFill>
+                  <a:schemeClr val="tx1"/>
+                </a:solidFill>
+              </a:rPr>
+              <a:t>weeks</a:t>
+            </a:r>
+            <a:r>
+              <a:rPr lang="sv-SE" dirty="0">
+                <a:solidFill>
+                  <a:schemeClr val="tx1"/>
+                </a:solidFill>
+              </a:rPr>
+              <a:t>, 8 </a:t>
+            </a:r>
+            <a:r>
+              <a:rPr lang="sv-SE" dirty="0" err="1">
+                <a:solidFill>
+                  <a:schemeClr val="tx1"/>
+                </a:solidFill>
+              </a:rPr>
+              <a:t>years</a:t>
             </a:r>
             <a:endParaRPr lang="sv-SE" dirty="0"/>
           </a:p>
@@ -8695,12 +8843,20 @@
               <a:buChar char="•"/>
             </a:pPr>
             <a:r>
+              <a:rPr lang="sv-SE" dirty="0" err="1">
+                <a:solidFill>
+                  <a:schemeClr val="tx1"/>
+                </a:solidFill>
+              </a:rPr>
+              <a:t>Detrend</a:t>
+            </a:r>
+            <a:r>
               <a:rPr lang="sv-SE" dirty="0">
                 <a:solidFill>
                   <a:schemeClr val="tx1"/>
                 </a:solidFill>
               </a:rPr>
-              <a:t>Fit </a:t>
+              <a:t> as </a:t>
             </a:r>
             <a:r>
               <a:rPr lang="sv-SE" dirty="0" err="1">
@@ -8724,7 +8880,7 @@
                   <a:schemeClr val="tx1"/>
                 </a:solidFill>
               </a:rPr>
-              <a:t>monthlyavg</a:t>
+              <a:t>weekly_average</a:t>
             </a:r>
             <a:r>
               <a:rPr lang="sv-SE" dirty="0">
@@ -8740,7 +8896,7 @@
                   <a:schemeClr val="tx1"/>
                 </a:solidFill>
               </a:rPr>
-              <a:t>dept</a:t>
+              <a:t>depth</a:t>
             </a:r>
             <a:r>
               <a:rPr lang="sv-SE" dirty="0">
@@ -8748,31 +8904,7 @@
                   <a:schemeClr val="tx1"/>
                 </a:solidFill>
               </a:rPr>
-              <a:t>), and </a:t>
-            </a:r>
-            <a:r>
-              <a:rPr lang="sv-SE" dirty="0" err="1">
-                <a:solidFill>
-                  <a:schemeClr val="tx1"/>
-                </a:solidFill>
-              </a:rPr>
-              <a:t>linear</a:t>
-            </a:r>
-            <a:r>
-              <a:rPr lang="sv-SE" dirty="0">
-                <a:solidFill>
-                  <a:schemeClr val="tx1"/>
-                </a:solidFill>
-              </a:rPr>
-              <a:t> </a:t>
-            </a:r>
-            <a:r>
-              <a:rPr lang="sv-SE" dirty="0" err="1">
-                <a:solidFill>
-                  <a:schemeClr val="tx1"/>
-                </a:solidFill>
-              </a:rPr>
-              <a:t>model</a:t>
+              <a:t>)</a:t>
             </a:r>
             <a:endParaRPr lang="sv-SE" dirty="0"/>
           </a:p>
@@ -8800,8 +8932,8 @@
         </p:blipFill>
         <p:spPr>
           <a:xfrm>
-            <a:off x="955677" y="3122327"/>
-            <a:ext cx="2119281" cy="1369295"/>
+            <a:off x="955677" y="3241053"/>
+            <a:ext cx="2208087" cy="1426674"/>
           </a:xfrm>
           <a:prstGeom prst="rect">
             <a:avLst/>
@@ -8830,8 +8962,8 @@
         </p:blipFill>
         <p:spPr>
           <a:xfrm>
-            <a:off x="990328" y="1891368"/>
-            <a:ext cx="2049977" cy="1169839"/>
+            <a:off x="990328" y="1855894"/>
+            <a:ext cx="2135879" cy="1218860"/>
           </a:xfrm>
           <a:prstGeom prst="rect">
             <a:avLst/>
@@ -8969,69 +9101,8 @@
                   <a:schemeClr val="tx1"/>
                 </a:solidFill>
               </a:rPr>
-              <a:t>Looks like AR, </a:t>
-            </a:r>
-            <a:r>
-              <a:rPr lang="sv-SE" dirty="0" err="1">
-                <a:solidFill>
-                  <a:schemeClr val="tx1"/>
-                </a:solidFill>
-              </a:rPr>
-              <a:t>however</a:t>
-            </a:r>
-            <a:r>
-              <a:rPr lang="sv-SE" dirty="0">
-                <a:solidFill>
-                  <a:schemeClr val="tx1"/>
-                </a:solidFill>
-              </a:rPr>
-              <a:t> </a:t>
-            </a:r>
-            <a:r>
-              <a:rPr lang="sv-SE" dirty="0" err="1">
-                <a:solidFill>
-                  <a:schemeClr val="tx1"/>
-                </a:solidFill>
-              </a:rPr>
-              <a:t>many</a:t>
-            </a:r>
-            <a:r>
-              <a:rPr lang="sv-SE" dirty="0">
-                <a:solidFill>
-                  <a:schemeClr val="tx1"/>
-                </a:solidFill>
-              </a:rPr>
-              <a:t> </a:t>
-            </a:r>
-            <a:r>
-              <a:rPr lang="sv-SE" dirty="0" err="1">
-                <a:solidFill>
-                  <a:schemeClr val="tx1"/>
-                </a:solidFill>
-              </a:rPr>
-              <a:t>significant</a:t>
-            </a:r>
-            <a:r>
-              <a:rPr lang="sv-SE" dirty="0">
-                <a:solidFill>
-                  <a:schemeClr val="tx1"/>
-                </a:solidFill>
-              </a:rPr>
-              <a:t> </a:t>
-            </a:r>
-            <a:r>
-              <a:rPr lang="sv-SE" dirty="0" err="1">
-                <a:solidFill>
-                  <a:schemeClr val="tx1"/>
-                </a:solidFill>
-              </a:rPr>
-              <a:t>values</a:t>
-            </a:r>
-            <a:endParaRPr lang="sv-SE" dirty="0">
-              <a:solidFill>
-                <a:schemeClr val="tx1"/>
-              </a:solidFill>
-            </a:endParaRPr>
+              <a:t>Looks like AR(1)</a:t>
+            </a:r>
           </a:p>
           <a:p>
             <a:pPr lvl="1">
@@ -9039,12 +9110,20 @@
               <a:buChar char="•"/>
             </a:pPr>
             <a:r>
+              <a:rPr lang="sv-SE" dirty="0">
+                <a:solidFill>
+                  <a:schemeClr val="tx1"/>
+                </a:solidFill>
+              </a:rPr>
+              <a:t>No </a:t>
+            </a:r>
+            <a:r>
               <a:rPr lang="sv-SE" dirty="0" err="1">
                 <a:solidFill>
                   <a:schemeClr val="tx1"/>
                 </a:solidFill>
               </a:rPr>
-              <a:t>Pacf</a:t>
+              <a:t>yearly</a:t>
             </a:r>
             <a:r>
               <a:rPr lang="sv-SE" dirty="0">
@@ -9052,7 +9131,7 @@
                   <a:schemeClr val="tx1"/>
                 </a:solidFill>
               </a:rPr>
-              <a:t> at lag 1 </a:t>
+              <a:t> </a:t>
             </a:r>
             <a:r>
               <a:rPr lang="sv-SE" dirty="0" err="1">
@@ -9060,7 +9139,7 @@
                   <a:schemeClr val="tx1"/>
                 </a:solidFill>
               </a:rPr>
-              <a:t>year</a:t>
+              <a:t>peak</a:t>
             </a:r>
             <a:r>
               <a:rPr lang="sv-SE" dirty="0">
@@ -9068,7 +9147,7 @@
                   <a:schemeClr val="tx1"/>
                 </a:solidFill>
               </a:rPr>
-              <a:t>, </a:t>
+              <a:t> in </a:t>
             </a:r>
             <a:r>
               <a:rPr lang="sv-SE" dirty="0" err="1">
@@ -9076,134 +9155,123 @@
                   <a:schemeClr val="tx1"/>
                 </a:solidFill>
               </a:rPr>
-              <a:t>but</a:t>
-            </a:r>
-            <a:r>
-              <a:rPr lang="sv-SE" dirty="0">
-                <a:solidFill>
-                  <a:schemeClr val="tx1"/>
-                </a:solidFill>
-              </a:rPr>
-              <a:t> no </a:t>
-            </a:r>
-            <a:r>
-              <a:rPr lang="sv-SE" dirty="0" err="1">
-                <a:solidFill>
-                  <a:schemeClr val="tx1"/>
-                </a:solidFill>
-              </a:rPr>
-              <a:t>peak</a:t>
-            </a:r>
-            <a:r>
-              <a:rPr lang="sv-SE" dirty="0">
-                <a:solidFill>
-                  <a:schemeClr val="tx1"/>
-                </a:solidFill>
-              </a:rPr>
-              <a:t> on </a:t>
-            </a:r>
-            <a:r>
-              <a:rPr lang="sv-SE" dirty="0" err="1">
-                <a:solidFill>
-                  <a:schemeClr val="tx1"/>
-                </a:solidFill>
-              </a:rPr>
               <a:t>periodogram</a:t>
             </a:r>
             <a:endParaRPr lang="sv-SE" dirty="0"/>
           </a:p>
         </p:txBody>
       </p:sp>
-      <p:pic>
-        <p:nvPicPr>
-          <p:cNvPr id="5" name="Picture 4">
+      <p:grpSp>
+        <p:nvGrpSpPr>
+          <p:cNvPr id="9" name="Group 8">
             <a:extLst>
               <a:ext uri="{FF2B5EF4-FFF2-40B4-BE49-F238E27FC236}">
-                <a16:creationId xmlns:a16="http://schemas.microsoft.com/office/drawing/2014/main" id="{1C24BB98-AA6F-4C48-B0D5-19D4DB119887}"/>
+                <a16:creationId xmlns:a16="http://schemas.microsoft.com/office/drawing/2014/main" id="{AC8B13AB-0FDE-45F9-95C3-90F7037CA135}"/>
               </a:ext>
             </a:extLst>
           </p:cNvPr>
-          <p:cNvPicPr>
-            <a:picLocks noChangeAspect="1"/>
-          </p:cNvPicPr>
+          <p:cNvGrpSpPr/>
           <p:nvPr/>
-        </p:nvPicPr>
-        <p:blipFill>
-          <a:blip r:embed="rId3"/>
-          <a:stretch>
-            <a:fillRect/>
-          </a:stretch>
-        </p:blipFill>
-        <p:spPr>
+        </p:nvGrpSpPr>
+        <p:grpSpPr>
           <a:xfrm>
-            <a:off x="775474" y="2035289"/>
-            <a:ext cx="2657204" cy="2199526"/>
+            <a:off x="492582" y="2110708"/>
+            <a:ext cx="8158836" cy="2024129"/>
+            <a:chOff x="624883" y="2110708"/>
+            <a:chExt cx="8158836" cy="2024129"/>
           </a:xfrm>
-          <a:prstGeom prst="rect">
-            <a:avLst/>
-          </a:prstGeom>
-        </p:spPr>
-      </p:pic>
-      <p:pic>
-        <p:nvPicPr>
-          <p:cNvPr id="7" name="Picture 6">
-            <a:extLst>
-              <a:ext uri="{FF2B5EF4-FFF2-40B4-BE49-F238E27FC236}">
-                <a16:creationId xmlns:a16="http://schemas.microsoft.com/office/drawing/2014/main" id="{26A09A63-D70E-4F04-B16B-A9A62475BBCD}"/>
-              </a:ext>
-            </a:extLst>
-          </p:cNvPr>
-          <p:cNvPicPr>
-            <a:picLocks noChangeAspect="1"/>
-          </p:cNvPicPr>
-          <p:nvPr/>
-        </p:nvPicPr>
-        <p:blipFill>
-          <a:blip r:embed="rId4"/>
-          <a:stretch>
-            <a:fillRect/>
-          </a:stretch>
-        </p:blipFill>
-        <p:spPr>
-          <a:xfrm>
-            <a:off x="3485214" y="2010528"/>
-            <a:ext cx="2634985" cy="2203968"/>
-          </a:xfrm>
-          <a:prstGeom prst="rect">
-            <a:avLst/>
-          </a:prstGeom>
-        </p:spPr>
-      </p:pic>
-      <p:pic>
-        <p:nvPicPr>
-          <p:cNvPr id="10" name="Picture 9">
-            <a:extLst>
-              <a:ext uri="{FF2B5EF4-FFF2-40B4-BE49-F238E27FC236}">
-                <a16:creationId xmlns:a16="http://schemas.microsoft.com/office/drawing/2014/main" id="{209F6720-6798-465E-9FF4-24FA68BB1E7E}"/>
-              </a:ext>
-            </a:extLst>
-          </p:cNvPr>
-          <p:cNvPicPr>
-            <a:picLocks noChangeAspect="1"/>
-          </p:cNvPicPr>
-          <p:nvPr/>
-        </p:nvPicPr>
-        <p:blipFill>
-          <a:blip r:embed="rId5"/>
-          <a:stretch>
-            <a:fillRect/>
-          </a:stretch>
-        </p:blipFill>
-        <p:spPr>
-          <a:xfrm>
-            <a:off x="6277918" y="2223816"/>
-            <a:ext cx="2680778" cy="1777393"/>
-          </a:xfrm>
-          <a:prstGeom prst="rect">
-            <a:avLst/>
-          </a:prstGeom>
-        </p:spPr>
-      </p:pic>
+        </p:grpSpPr>
+        <p:pic>
+          <p:nvPicPr>
+            <p:cNvPr id="4" name="Picture 3">
+              <a:extLst>
+                <a:ext uri="{FF2B5EF4-FFF2-40B4-BE49-F238E27FC236}">
+                  <a16:creationId xmlns:a16="http://schemas.microsoft.com/office/drawing/2014/main" id="{0242C63E-59DB-44C4-951F-27E948F9AB00}"/>
+                </a:ext>
+              </a:extLst>
+            </p:cNvPr>
+            <p:cNvPicPr>
+              <a:picLocks noChangeAspect="1"/>
+            </p:cNvPicPr>
+            <p:nvPr/>
+          </p:nvPicPr>
+          <p:blipFill>
+            <a:blip r:embed="rId3"/>
+            <a:stretch>
+              <a:fillRect/>
+            </a:stretch>
+          </p:blipFill>
+          <p:spPr>
+            <a:xfrm>
+              <a:off x="624883" y="2135268"/>
+              <a:ext cx="2750445" cy="1999569"/>
+            </a:xfrm>
+            <a:prstGeom prst="rect">
+              <a:avLst/>
+            </a:prstGeom>
+          </p:spPr>
+        </p:pic>
+        <p:pic>
+          <p:nvPicPr>
+            <p:cNvPr id="8" name="Picture 7">
+              <a:extLst>
+                <a:ext uri="{FF2B5EF4-FFF2-40B4-BE49-F238E27FC236}">
+                  <a16:creationId xmlns:a16="http://schemas.microsoft.com/office/drawing/2014/main" id="{35D9B886-B37F-4C5D-9FB2-1CB17704D182}"/>
+                </a:ext>
+              </a:extLst>
+            </p:cNvPr>
+            <p:cNvPicPr>
+              <a:picLocks noChangeAspect="1"/>
+            </p:cNvPicPr>
+            <p:nvPr/>
+          </p:nvPicPr>
+          <p:blipFill>
+            <a:blip r:embed="rId4"/>
+            <a:stretch>
+              <a:fillRect/>
+            </a:stretch>
+          </p:blipFill>
+          <p:spPr>
+            <a:xfrm>
+              <a:off x="3375328" y="2110708"/>
+              <a:ext cx="2690676" cy="2003607"/>
+            </a:xfrm>
+            <a:prstGeom prst="rect">
+              <a:avLst/>
+            </a:prstGeom>
+          </p:spPr>
+        </p:pic>
+        <p:pic>
+          <p:nvPicPr>
+            <p:cNvPr id="3" name="Picture 2">
+              <a:extLst>
+                <a:ext uri="{FF2B5EF4-FFF2-40B4-BE49-F238E27FC236}">
+                  <a16:creationId xmlns:a16="http://schemas.microsoft.com/office/drawing/2014/main" id="{1C4ED85A-0B3D-4245-90A0-5FDE749DACCE}"/>
+                </a:ext>
+              </a:extLst>
+            </p:cNvPr>
+            <p:cNvPicPr>
+              <a:picLocks noChangeAspect="1"/>
+            </p:cNvPicPr>
+            <p:nvPr/>
+          </p:nvPicPr>
+          <p:blipFill>
+            <a:blip r:embed="rId5"/>
+            <a:stretch>
+              <a:fillRect/>
+            </a:stretch>
+          </p:blipFill>
+          <p:spPr>
+            <a:xfrm>
+              <a:off x="6066004" y="2223814"/>
+              <a:ext cx="2717715" cy="1777393"/>
+            </a:xfrm>
+            <a:prstGeom prst="rect">
+              <a:avLst/>
+            </a:prstGeom>
+          </p:spPr>
+        </p:pic>
+      </p:grpSp>
     </p:spTree>
     <p:extLst>
       <p:ext uri="{BB962C8B-B14F-4D97-AF65-F5344CB8AC3E}">
@@ -9321,8 +9389,37 @@
                   <a:schemeClr val="tx1"/>
                 </a:solidFill>
               </a:rPr>
-              <a:t> (2,1,2)X(1,1,0)[52]</a:t>
-            </a:r>
+              <a:t> ARMA(2,1,2)X(1,1,0)[52] </a:t>
+            </a:r>
+            <a:r>
+              <a:rPr lang="sv-SE" dirty="0" err="1">
+                <a:solidFill>
+                  <a:schemeClr val="tx1"/>
+                </a:solidFill>
+              </a:rPr>
+              <a:t>according</a:t>
+            </a:r>
+            <a:r>
+              <a:rPr lang="sv-SE" dirty="0">
+                <a:solidFill>
+                  <a:schemeClr val="tx1"/>
+                </a:solidFill>
+              </a:rPr>
+              <a:t> to AIC </a:t>
+            </a:r>
+            <a:r>
+              <a:rPr lang="sv-SE" dirty="0" err="1">
+                <a:solidFill>
+                  <a:schemeClr val="tx1"/>
+                </a:solidFill>
+              </a:rPr>
+              <a:t>measurement</a:t>
+            </a:r>
+            <a:endParaRPr lang="sv-SE" dirty="0">
+              <a:solidFill>
+                <a:schemeClr val="tx1"/>
+              </a:solidFill>
+            </a:endParaRPr>
           </a:p>
           <a:p>
             <a:pPr lvl="1">
@@ -9441,7 +9538,7 @@
     </p:spTree>
     <p:extLst>
       <p:ext uri="{BB962C8B-B14F-4D97-AF65-F5344CB8AC3E}">
-        <p14:creationId xmlns:p14="http://schemas.microsoft.com/office/powerpoint/2010/main" val="2269113570"/>
+        <p14:creationId xmlns:p14="http://schemas.microsoft.com/office/powerpoint/2010/main" val="2991796880"/>
       </p:ext>
     </p:extLst>
   </p:cSld>

</xml_diff>